<commit_message>
done with presentation in the morning
</commit_message>
<xml_diff>
--- a/week_10/Alexander_Molodyh_CS365_Presentation.pptx
+++ b/week_10/Alexander_Molodyh_CS365_Presentation.pptx
@@ -219,7 +219,7 @@
           <a:p>
             <a:fld id="{1DB140F7-6A97-4CBB-A042-8AA3ED0D7552}" type="datetimeFigureOut">
               <a:rPr lang="en-US" smtClean="0"/>
-              <a:t>3/11/2018</a:t>
+              <a:t>3/12/2018</a:t>
             </a:fld>
             <a:endParaRPr lang="en-US"/>
           </a:p>
@@ -1382,7 +1382,7 @@
           <a:p>
             <a:fld id="{513DB3D1-05F1-479B-9C16-3CD4BF2D99AA}" type="datetimeFigureOut">
               <a:rPr lang="en-US" smtClean="0"/>
-              <a:t>3/11/2018</a:t>
+              <a:t>3/12/2018</a:t>
             </a:fld>
             <a:endParaRPr lang="en-US"/>
           </a:p>
@@ -1572,7 +1572,7 @@
           <a:p>
             <a:fld id="{513DB3D1-05F1-479B-9C16-3CD4BF2D99AA}" type="datetimeFigureOut">
               <a:rPr lang="en-US" smtClean="0"/>
-              <a:t>3/11/2018</a:t>
+              <a:t>3/12/2018</a:t>
             </a:fld>
             <a:endParaRPr lang="en-US"/>
           </a:p>
@@ -1752,7 +1752,7 @@
           <a:p>
             <a:fld id="{513DB3D1-05F1-479B-9C16-3CD4BF2D99AA}" type="datetimeFigureOut">
               <a:rPr lang="en-US" smtClean="0"/>
-              <a:t>3/11/2018</a:t>
+              <a:t>3/12/2018</a:t>
             </a:fld>
             <a:endParaRPr lang="en-US"/>
           </a:p>
@@ -1922,7 +1922,7 @@
           <a:p>
             <a:fld id="{513DB3D1-05F1-479B-9C16-3CD4BF2D99AA}" type="datetimeFigureOut">
               <a:rPr lang="en-US" smtClean="0"/>
-              <a:t>3/11/2018</a:t>
+              <a:t>3/12/2018</a:t>
             </a:fld>
             <a:endParaRPr lang="en-US"/>
           </a:p>
@@ -2178,7 +2178,7 @@
           <a:p>
             <a:fld id="{513DB3D1-05F1-479B-9C16-3CD4BF2D99AA}" type="datetimeFigureOut">
               <a:rPr lang="en-US" smtClean="0"/>
-              <a:t>3/11/2018</a:t>
+              <a:t>3/12/2018</a:t>
             </a:fld>
             <a:endParaRPr lang="en-US"/>
           </a:p>
@@ -2466,7 +2466,7 @@
           <a:p>
             <a:fld id="{513DB3D1-05F1-479B-9C16-3CD4BF2D99AA}" type="datetimeFigureOut">
               <a:rPr lang="en-US" smtClean="0"/>
-              <a:t>3/11/2018</a:t>
+              <a:t>3/12/2018</a:t>
             </a:fld>
             <a:endParaRPr lang="en-US"/>
           </a:p>
@@ -2904,7 +2904,7 @@
           <a:p>
             <a:fld id="{513DB3D1-05F1-479B-9C16-3CD4BF2D99AA}" type="datetimeFigureOut">
               <a:rPr lang="en-US" smtClean="0"/>
-              <a:t>3/11/2018</a:t>
+              <a:t>3/12/2018</a:t>
             </a:fld>
             <a:endParaRPr lang="en-US"/>
           </a:p>
@@ -3022,7 +3022,7 @@
           <a:p>
             <a:fld id="{513DB3D1-05F1-479B-9C16-3CD4BF2D99AA}" type="datetimeFigureOut">
               <a:rPr lang="en-US" smtClean="0"/>
-              <a:t>3/11/2018</a:t>
+              <a:t>3/12/2018</a:t>
             </a:fld>
             <a:endParaRPr lang="en-US"/>
           </a:p>
@@ -3117,7 +3117,7 @@
           <a:p>
             <a:fld id="{513DB3D1-05F1-479B-9C16-3CD4BF2D99AA}" type="datetimeFigureOut">
               <a:rPr lang="en-US" smtClean="0"/>
-              <a:t>3/11/2018</a:t>
+              <a:t>3/12/2018</a:t>
             </a:fld>
             <a:endParaRPr lang="en-US"/>
           </a:p>
@@ -3473,7 +3473,7 @@
           <a:p>
             <a:fld id="{513DB3D1-05F1-479B-9C16-3CD4BF2D99AA}" type="datetimeFigureOut">
               <a:rPr lang="en-US" smtClean="0"/>
-              <a:t>3/11/2018</a:t>
+              <a:t>3/12/2018</a:t>
             </a:fld>
             <a:endParaRPr lang="en-US"/>
           </a:p>
@@ -3792,7 +3792,7 @@
           <a:p>
             <a:fld id="{513DB3D1-05F1-479B-9C16-3CD4BF2D99AA}" type="datetimeFigureOut">
               <a:rPr lang="en-US" smtClean="0"/>
-              <a:t>3/11/2018</a:t>
+              <a:t>3/12/2018</a:t>
             </a:fld>
             <a:endParaRPr lang="en-US"/>
           </a:p>
@@ -4025,7 +4025,7 @@
           <a:p>
             <a:fld id="{513DB3D1-05F1-479B-9C16-3CD4BF2D99AA}" type="datetimeFigureOut">
               <a:rPr lang="en-US" smtClean="0"/>
-              <a:t>3/11/2018</a:t>
+              <a:t>3/12/2018</a:t>
             </a:fld>
             <a:endParaRPr lang="en-US"/>
           </a:p>
@@ -4550,11 +4550,11 @@
   <p:clrMapOvr>
     <a:masterClrMapping/>
   </p:clrMapOvr>
-  <mc:AlternateContent xmlns:mc="http://schemas.openxmlformats.org/markup-compatibility/2006">
-    <mc:Choice xmlns:p14="http://schemas.microsoft.com/office/powerpoint/2010/main" Requires="p14">
+  <mc:AlternateContent xmlns:mc="http://schemas.openxmlformats.org/markup-compatibility/2006" xmlns:p14="http://schemas.microsoft.com/office/powerpoint/2010/main">
+    <mc:Choice Requires="p14">
       <p:transition p14:dur="10"/>
     </mc:Choice>
-    <mc:Fallback>
+    <mc:Fallback xmlns="">
       <p:transition/>
     </mc:Fallback>
   </mc:AlternateContent>

</xml_diff>